<commit_message>
Multiple corrections on the html pages, plus qa on resources and examples
</commit_message>
<xml_diff>
--- a/input/images-source/LabExampleE1Technical.pptx
+++ b/input/images-source/LabExampleE1Technical.pptx
@@ -259,7 +259,7 @@
           <a:p>
             <a:fld id="{314C32E8-F0A9-4870-A32A-6F8F0D90A745}" type="datetimeFigureOut">
               <a:rPr lang="fr-FR" smtClean="0"/>
-              <a:t>11/02/2020</a:t>
+              <a:t>12/02/2020</a:t>
             </a:fld>
             <a:endParaRPr lang="fr-FR"/>
           </a:p>
@@ -457,7 +457,7 @@
           <a:p>
             <a:fld id="{314C32E8-F0A9-4870-A32A-6F8F0D90A745}" type="datetimeFigureOut">
               <a:rPr lang="fr-FR" smtClean="0"/>
-              <a:t>11/02/2020</a:t>
+              <a:t>12/02/2020</a:t>
             </a:fld>
             <a:endParaRPr lang="fr-FR"/>
           </a:p>
@@ -665,7 +665,7 @@
           <a:p>
             <a:fld id="{314C32E8-F0A9-4870-A32A-6F8F0D90A745}" type="datetimeFigureOut">
               <a:rPr lang="fr-FR" smtClean="0"/>
-              <a:t>11/02/2020</a:t>
+              <a:t>12/02/2020</a:t>
             </a:fld>
             <a:endParaRPr lang="fr-FR"/>
           </a:p>
@@ -863,7 +863,7 @@
           <a:p>
             <a:fld id="{314C32E8-F0A9-4870-A32A-6F8F0D90A745}" type="datetimeFigureOut">
               <a:rPr lang="fr-FR" smtClean="0"/>
-              <a:t>11/02/2020</a:t>
+              <a:t>12/02/2020</a:t>
             </a:fld>
             <a:endParaRPr lang="fr-FR"/>
           </a:p>
@@ -1138,7 +1138,7 @@
           <a:p>
             <a:fld id="{314C32E8-F0A9-4870-A32A-6F8F0D90A745}" type="datetimeFigureOut">
               <a:rPr lang="fr-FR" smtClean="0"/>
-              <a:t>11/02/2020</a:t>
+              <a:t>12/02/2020</a:t>
             </a:fld>
             <a:endParaRPr lang="fr-FR"/>
           </a:p>
@@ -1403,7 +1403,7 @@
           <a:p>
             <a:fld id="{314C32E8-F0A9-4870-A32A-6F8F0D90A745}" type="datetimeFigureOut">
               <a:rPr lang="fr-FR" smtClean="0"/>
-              <a:t>11/02/2020</a:t>
+              <a:t>12/02/2020</a:t>
             </a:fld>
             <a:endParaRPr lang="fr-FR"/>
           </a:p>
@@ -1815,7 +1815,7 @@
           <a:p>
             <a:fld id="{314C32E8-F0A9-4870-A32A-6F8F0D90A745}" type="datetimeFigureOut">
               <a:rPr lang="fr-FR" smtClean="0"/>
-              <a:t>11/02/2020</a:t>
+              <a:t>12/02/2020</a:t>
             </a:fld>
             <a:endParaRPr lang="fr-FR"/>
           </a:p>
@@ -1956,7 +1956,7 @@
           <a:p>
             <a:fld id="{314C32E8-F0A9-4870-A32A-6F8F0D90A745}" type="datetimeFigureOut">
               <a:rPr lang="fr-FR" smtClean="0"/>
-              <a:t>11/02/2020</a:t>
+              <a:t>12/02/2020</a:t>
             </a:fld>
             <a:endParaRPr lang="fr-FR"/>
           </a:p>
@@ -2069,7 +2069,7 @@
           <a:p>
             <a:fld id="{314C32E8-F0A9-4870-A32A-6F8F0D90A745}" type="datetimeFigureOut">
               <a:rPr lang="fr-FR" smtClean="0"/>
-              <a:t>11/02/2020</a:t>
+              <a:t>12/02/2020</a:t>
             </a:fld>
             <a:endParaRPr lang="fr-FR"/>
           </a:p>
@@ -2380,7 +2380,7 @@
           <a:p>
             <a:fld id="{314C32E8-F0A9-4870-A32A-6F8F0D90A745}" type="datetimeFigureOut">
               <a:rPr lang="fr-FR" smtClean="0"/>
-              <a:t>11/02/2020</a:t>
+              <a:t>12/02/2020</a:t>
             </a:fld>
             <a:endParaRPr lang="fr-FR"/>
           </a:p>
@@ -2668,7 +2668,7 @@
           <a:p>
             <a:fld id="{314C32E8-F0A9-4870-A32A-6F8F0D90A745}" type="datetimeFigureOut">
               <a:rPr lang="fr-FR" smtClean="0"/>
-              <a:t>11/02/2020</a:t>
+              <a:t>12/02/2020</a:t>
             </a:fld>
             <a:endParaRPr lang="fr-FR"/>
           </a:p>
@@ -2909,7 +2909,7 @@
           <a:p>
             <a:fld id="{314C32E8-F0A9-4870-A32A-6F8F0D90A745}" type="datetimeFigureOut">
               <a:rPr lang="fr-FR" smtClean="0"/>
-              <a:t>11/02/2020</a:t>
+              <a:t>12/02/2020</a:t>
             </a:fld>
             <a:endParaRPr lang="fr-FR"/>
           </a:p>
@@ -4546,8 +4546,8 @@
         </p:nvSpPr>
         <p:spPr>
           <a:xfrm>
-            <a:off x="265471" y="255639"/>
-            <a:ext cx="10874477" cy="584775"/>
+            <a:off x="240077" y="497033"/>
+            <a:ext cx="10874477" cy="461665"/>
           </a:xfrm>
           <a:prstGeom prst="rect">
             <a:avLst/>
@@ -4561,11 +4561,11 @@
           <a:lstStyle/>
           <a:p>
             <a:r>
-              <a:rPr lang="en-US" sz="3200" dirty="0"/>
+              <a:rPr lang="en-US" sz="2400" dirty="0"/>
               <a:t>E1: Serum potassium </a:t>
             </a:r>
             <a:r>
-              <a:rPr lang="en-US" sz="3200" dirty="0">
+              <a:rPr lang="en-US" sz="2400" dirty="0">
                 <a:highlight>
                   <a:srgbClr val="00FF00"/>
                 </a:highlight>
@@ -4573,11 +4573,11 @@
               <a:t>test</a:t>
             </a:r>
             <a:r>
-              <a:rPr lang="en-US" sz="3200" dirty="0"/>
+              <a:rPr lang="en-US" sz="2400" dirty="0"/>
               <a:t>, </a:t>
             </a:r>
             <a:r>
-              <a:rPr lang="en-US" sz="3200" dirty="0">
+              <a:rPr lang="en-US" sz="2400" dirty="0">
                 <a:highlight>
                   <a:srgbClr val="FFFF00"/>
                 </a:highlight>
@@ -4585,7 +4585,7 @@
               <a:t>orderable</a:t>
             </a:r>
             <a:r>
-              <a:rPr lang="en-US" sz="3200" dirty="0"/>
+              <a:rPr lang="en-US" sz="2400" dirty="0"/>
               <a:t>: summary of content</a:t>
             </a:r>
           </a:p>

</xml_diff>

<commit_message>
Change for handling reflex panels, and for specimen requirements
</commit_message>
<xml_diff>
--- a/input/images-source/LabExampleE1Technical.pptx
+++ b/input/images-source/LabExampleE1Technical.pptx
@@ -259,7 +259,7 @@
           <a:p>
             <a:fld id="{314C32E8-F0A9-4870-A32A-6F8F0D90A745}" type="datetimeFigureOut">
               <a:rPr lang="fr-FR" smtClean="0"/>
-              <a:t>12/02/2020</a:t>
+              <a:t>08/06/2020</a:t>
             </a:fld>
             <a:endParaRPr lang="fr-FR"/>
           </a:p>
@@ -457,7 +457,7 @@
           <a:p>
             <a:fld id="{314C32E8-F0A9-4870-A32A-6F8F0D90A745}" type="datetimeFigureOut">
               <a:rPr lang="fr-FR" smtClean="0"/>
-              <a:t>12/02/2020</a:t>
+              <a:t>08/06/2020</a:t>
             </a:fld>
             <a:endParaRPr lang="fr-FR"/>
           </a:p>
@@ -665,7 +665,7 @@
           <a:p>
             <a:fld id="{314C32E8-F0A9-4870-A32A-6F8F0D90A745}" type="datetimeFigureOut">
               <a:rPr lang="fr-FR" smtClean="0"/>
-              <a:t>12/02/2020</a:t>
+              <a:t>08/06/2020</a:t>
             </a:fld>
             <a:endParaRPr lang="fr-FR"/>
           </a:p>
@@ -863,7 +863,7 @@
           <a:p>
             <a:fld id="{314C32E8-F0A9-4870-A32A-6F8F0D90A745}" type="datetimeFigureOut">
               <a:rPr lang="fr-FR" smtClean="0"/>
-              <a:t>12/02/2020</a:t>
+              <a:t>08/06/2020</a:t>
             </a:fld>
             <a:endParaRPr lang="fr-FR"/>
           </a:p>
@@ -1138,7 +1138,7 @@
           <a:p>
             <a:fld id="{314C32E8-F0A9-4870-A32A-6F8F0D90A745}" type="datetimeFigureOut">
               <a:rPr lang="fr-FR" smtClean="0"/>
-              <a:t>12/02/2020</a:t>
+              <a:t>08/06/2020</a:t>
             </a:fld>
             <a:endParaRPr lang="fr-FR"/>
           </a:p>
@@ -1403,7 +1403,7 @@
           <a:p>
             <a:fld id="{314C32E8-F0A9-4870-A32A-6F8F0D90A745}" type="datetimeFigureOut">
               <a:rPr lang="fr-FR" smtClean="0"/>
-              <a:t>12/02/2020</a:t>
+              <a:t>08/06/2020</a:t>
             </a:fld>
             <a:endParaRPr lang="fr-FR"/>
           </a:p>
@@ -1815,7 +1815,7 @@
           <a:p>
             <a:fld id="{314C32E8-F0A9-4870-A32A-6F8F0D90A745}" type="datetimeFigureOut">
               <a:rPr lang="fr-FR" smtClean="0"/>
-              <a:t>12/02/2020</a:t>
+              <a:t>08/06/2020</a:t>
             </a:fld>
             <a:endParaRPr lang="fr-FR"/>
           </a:p>
@@ -1956,7 +1956,7 @@
           <a:p>
             <a:fld id="{314C32E8-F0A9-4870-A32A-6F8F0D90A745}" type="datetimeFigureOut">
               <a:rPr lang="fr-FR" smtClean="0"/>
-              <a:t>12/02/2020</a:t>
+              <a:t>08/06/2020</a:t>
             </a:fld>
             <a:endParaRPr lang="fr-FR"/>
           </a:p>
@@ -2069,7 +2069,7 @@
           <a:p>
             <a:fld id="{314C32E8-F0A9-4870-A32A-6F8F0D90A745}" type="datetimeFigureOut">
               <a:rPr lang="fr-FR" smtClean="0"/>
-              <a:t>12/02/2020</a:t>
+              <a:t>08/06/2020</a:t>
             </a:fld>
             <a:endParaRPr lang="fr-FR"/>
           </a:p>
@@ -2380,7 +2380,7 @@
           <a:p>
             <a:fld id="{314C32E8-F0A9-4870-A32A-6F8F0D90A745}" type="datetimeFigureOut">
               <a:rPr lang="fr-FR" smtClean="0"/>
-              <a:t>12/02/2020</a:t>
+              <a:t>08/06/2020</a:t>
             </a:fld>
             <a:endParaRPr lang="fr-FR"/>
           </a:p>
@@ -2668,7 +2668,7 @@
           <a:p>
             <a:fld id="{314C32E8-F0A9-4870-A32A-6F8F0D90A745}" type="datetimeFigureOut">
               <a:rPr lang="fr-FR" smtClean="0"/>
-              <a:t>12/02/2020</a:t>
+              <a:t>08/06/2020</a:t>
             </a:fld>
             <a:endParaRPr lang="fr-FR"/>
           </a:p>
@@ -2909,7 +2909,7 @@
           <a:p>
             <a:fld id="{314C32E8-F0A9-4870-A32A-6F8F0D90A745}" type="datetimeFigureOut">
               <a:rPr lang="fr-FR" smtClean="0"/>
-              <a:t>12/02/2020</a:t>
+              <a:t>08/06/2020</a:t>
             </a:fld>
             <a:endParaRPr lang="fr-FR"/>
           </a:p>
@@ -3328,10 +3328,10 @@
       </p:grpSpPr>
       <p:sp>
         <p:nvSpPr>
-          <p:cNvPr id="4" name="Rectangle : coins arrondis 3">
-            <a:extLst>
-              <a:ext uri="{FF2B5EF4-FFF2-40B4-BE49-F238E27FC236}">
-                <a16:creationId xmlns:a16="http://schemas.microsoft.com/office/drawing/2014/main" id="{76D005D9-2037-4F5C-9179-DFDC2659B7F0}"/>
+          <p:cNvPr id="14" name="Rectangle : coins arrondis 13">
+            <a:extLst>
+              <a:ext uri="{FF2B5EF4-FFF2-40B4-BE49-F238E27FC236}">
+                <a16:creationId xmlns:a16="http://schemas.microsoft.com/office/drawing/2014/main" id="{A786479A-5C3B-46BD-A409-D69F9CB09CC0}"/>
               </a:ext>
             </a:extLst>
           </p:cNvPr>
@@ -3340,12 +3340,12 @@
         </p:nvSpPr>
         <p:spPr>
           <a:xfrm>
-            <a:off x="5699088" y="3675843"/>
-            <a:ext cx="3176012" cy="2499456"/>
+            <a:off x="5805104" y="3622835"/>
+            <a:ext cx="3176012" cy="2121980"/>
           </a:xfrm>
           <a:prstGeom prst="roundRect">
             <a:avLst>
-              <a:gd name="adj" fmla="val 4813"/>
+              <a:gd name="adj" fmla="val 3753"/>
             </a:avLst>
           </a:prstGeom>
           <a:noFill/>
@@ -3525,7 +3525,7 @@
                   <a:srgbClr val="0070C0"/>
                 </a:solidFill>
               </a:rPr>
-              <a:t>specimenRequirement</a:t>
+              <a:t>observationRequirement</a:t>
             </a:r>
           </a:p>
           <a:p>
@@ -3536,17 +3536,6 @@
                   <a:srgbClr val="0070C0"/>
                 </a:solidFill>
               </a:rPr>
-              <a:t>observationRequirement</a:t>
-            </a:r>
-          </a:p>
-          <a:p>
-            <a:pPr marL="268288"/>
-            <a:r>
-              <a:rPr lang="en-US" sz="1600" noProof="1">
-                <a:solidFill>
-                  <a:srgbClr val="0070C0"/>
-                </a:solidFill>
-              </a:rPr>
               <a:t>observationResultRequirement </a:t>
             </a:r>
           </a:p>
@@ -3554,10 +3543,10 @@
       </p:sp>
       <p:sp>
         <p:nvSpPr>
-          <p:cNvPr id="6" name="Rectangle : coins arrondis 5">
-            <a:extLst>
-              <a:ext uri="{FF2B5EF4-FFF2-40B4-BE49-F238E27FC236}">
-                <a16:creationId xmlns:a16="http://schemas.microsoft.com/office/drawing/2014/main" id="{DE115957-E080-48FD-B763-B520C28E97DD}"/>
+          <p:cNvPr id="15" name="Rectangle : coins arrondis 14">
+            <a:extLst>
+              <a:ext uri="{FF2B5EF4-FFF2-40B4-BE49-F238E27FC236}">
+                <a16:creationId xmlns:a16="http://schemas.microsoft.com/office/drawing/2014/main" id="{D2012E5F-6CFF-4FA1-AFE1-BDACF15B7823}"/>
               </a:ext>
             </a:extLst>
           </p:cNvPr>
@@ -3566,7 +3555,7 @@
         </p:nvSpPr>
         <p:spPr>
           <a:xfrm>
-            <a:off x="9124495" y="2986550"/>
+            <a:off x="5790175" y="2085402"/>
             <a:ext cx="2283724" cy="1211729"/>
           </a:xfrm>
           <a:prstGeom prst="roundRect">
@@ -3647,10 +3636,10 @@
       </p:sp>
       <p:sp>
         <p:nvSpPr>
-          <p:cNvPr id="24" name="Rectangle : coins arrondis 23">
-            <a:extLst>
-              <a:ext uri="{FF2B5EF4-FFF2-40B4-BE49-F238E27FC236}">
-                <a16:creationId xmlns:a16="http://schemas.microsoft.com/office/drawing/2014/main" id="{02AB1110-47D1-40E7-99B0-0EA356ADDA45}"/>
+          <p:cNvPr id="16" name="Rectangle : coins arrondis 15">
+            <a:extLst>
+              <a:ext uri="{FF2B5EF4-FFF2-40B4-BE49-F238E27FC236}">
+                <a16:creationId xmlns:a16="http://schemas.microsoft.com/office/drawing/2014/main" id="{6DEA4A0E-0208-4656-BCCE-5B0DF846C6FC}"/>
               </a:ext>
             </a:extLst>
           </p:cNvPr>
@@ -3659,7 +3648,7 @@
         </p:nvSpPr>
         <p:spPr>
           <a:xfrm>
-            <a:off x="9124495" y="5480528"/>
+            <a:off x="9230511" y="4837806"/>
             <a:ext cx="2283724" cy="910440"/>
           </a:xfrm>
           <a:prstGeom prst="roundRect">
@@ -3729,23 +3718,22 @@
       </p:sp>
       <p:cxnSp>
         <p:nvCxnSpPr>
-          <p:cNvPr id="31" name="Connecteur droit avec flèche 30">
-            <a:extLst>
-              <a:ext uri="{FF2B5EF4-FFF2-40B4-BE49-F238E27FC236}">
-                <a16:creationId xmlns:a16="http://schemas.microsoft.com/office/drawing/2014/main" id="{F85AD6A8-6DC1-48C5-97A4-6CA1DB5FAC27}"/>
+          <p:cNvPr id="17" name="Connecteur droit avec flèche 16">
+            <a:extLst>
+              <a:ext uri="{FF2B5EF4-FFF2-40B4-BE49-F238E27FC236}">
+                <a16:creationId xmlns:a16="http://schemas.microsoft.com/office/drawing/2014/main" id="{255E4918-C9AD-402C-92A7-54C959DF71C7}"/>
               </a:ext>
             </a:extLst>
           </p:cNvPr>
           <p:cNvCxnSpPr>
             <a:cxnSpLocks/>
-            <a:endCxn id="24" idx="1"/>
           </p:cNvCxnSpPr>
           <p:nvPr/>
         </p:nvCxnSpPr>
         <p:spPr>
-          <a:xfrm>
-            <a:off x="8752114" y="5900057"/>
-            <a:ext cx="372381" cy="35691"/>
+          <a:xfrm flipV="1">
+            <a:off x="8852452" y="5316706"/>
+            <a:ext cx="378059" cy="247228"/>
           </a:xfrm>
           <a:prstGeom prst="straightConnector1">
             <a:avLst/>
@@ -3774,23 +3762,67 @@
       </p:cxnSp>
       <p:cxnSp>
         <p:nvCxnSpPr>
-          <p:cNvPr id="26" name="Connecteur droit avec flèche 25">
-            <a:extLst>
-              <a:ext uri="{FF2B5EF4-FFF2-40B4-BE49-F238E27FC236}">
-                <a16:creationId xmlns:a16="http://schemas.microsoft.com/office/drawing/2014/main" id="{5B506B3C-8504-4607-A0EC-8CFF7B905C49}"/>
+          <p:cNvPr id="18" name="Connecteur droit avec flèche 17">
+            <a:extLst>
+              <a:ext uri="{FF2B5EF4-FFF2-40B4-BE49-F238E27FC236}">
+                <a16:creationId xmlns:a16="http://schemas.microsoft.com/office/drawing/2014/main" id="{1475BC03-D726-4500-8CC2-BF5530AF7C69}"/>
               </a:ext>
             </a:extLst>
           </p:cNvPr>
           <p:cNvCxnSpPr>
             <a:cxnSpLocks/>
-            <a:endCxn id="6" idx="1"/>
+            <a:endCxn id="15" idx="1"/>
           </p:cNvCxnSpPr>
           <p:nvPr/>
         </p:nvCxnSpPr>
         <p:spPr>
           <a:xfrm flipV="1">
-            <a:off x="8131629" y="3592415"/>
-            <a:ext cx="992866" cy="1767218"/>
+            <a:off x="5247861" y="2691267"/>
+            <a:ext cx="542314" cy="2344559"/>
+          </a:xfrm>
+          <a:prstGeom prst="straightConnector1">
+            <a:avLst/>
+          </a:prstGeom>
+          <a:ln>
+            <a:solidFill>
+              <a:srgbClr val="00B050"/>
+            </a:solidFill>
+            <a:tailEnd type="triangle" w="lg" len="lg"/>
+          </a:ln>
+        </p:spPr>
+        <p:style>
+          <a:lnRef idx="1">
+            <a:schemeClr val="accent1"/>
+          </a:lnRef>
+          <a:fillRef idx="0">
+            <a:schemeClr val="accent1"/>
+          </a:fillRef>
+          <a:effectRef idx="0">
+            <a:schemeClr val="accent1"/>
+          </a:effectRef>
+          <a:fontRef idx="minor">
+            <a:schemeClr val="tx1"/>
+          </a:fontRef>
+        </p:style>
+      </p:cxnSp>
+      <p:cxnSp>
+        <p:nvCxnSpPr>
+          <p:cNvPr id="19" name="Connecteur droit avec flèche 18">
+            <a:extLst>
+              <a:ext uri="{FF2B5EF4-FFF2-40B4-BE49-F238E27FC236}">
+                <a16:creationId xmlns:a16="http://schemas.microsoft.com/office/drawing/2014/main" id="{179A0D87-77F3-4021-A4F1-714933380921}"/>
+              </a:ext>
+            </a:extLst>
+          </p:cNvPr>
+          <p:cNvCxnSpPr>
+            <a:cxnSpLocks/>
+          </p:cNvCxnSpPr>
+          <p:nvPr/>
+        </p:nvCxnSpPr>
+        <p:spPr>
+          <a:xfrm flipV="1">
+            <a:off x="5247861" y="4658749"/>
+            <a:ext cx="557243" cy="905185"/>
           </a:xfrm>
           <a:prstGeom prst="straightConnector1">
             <a:avLst/>
@@ -3817,57 +3849,12 @@
           </a:fontRef>
         </p:style>
       </p:cxnSp>
-      <p:cxnSp>
-        <p:nvCxnSpPr>
-          <p:cNvPr id="38" name="Connecteur droit avec flèche 37">
-            <a:extLst>
-              <a:ext uri="{FF2B5EF4-FFF2-40B4-BE49-F238E27FC236}">
-                <a16:creationId xmlns:a16="http://schemas.microsoft.com/office/drawing/2014/main" id="{EF1F3B6C-6D4A-41A5-AF56-0F82A7D7C1BF}"/>
-              </a:ext>
-            </a:extLst>
-          </p:cNvPr>
-          <p:cNvCxnSpPr>
-            <a:cxnSpLocks/>
-            <a:endCxn id="4" idx="1"/>
-          </p:cNvCxnSpPr>
-          <p:nvPr/>
-        </p:nvCxnSpPr>
-        <p:spPr>
-          <a:xfrm flipV="1">
-            <a:off x="4974771" y="4925571"/>
-            <a:ext cx="724317" cy="366845"/>
-          </a:xfrm>
-          <a:prstGeom prst="straightConnector1">
-            <a:avLst/>
-          </a:prstGeom>
-          <a:ln>
-            <a:solidFill>
-              <a:schemeClr val="tx1"/>
-            </a:solidFill>
-            <a:tailEnd type="triangle" w="lg" len="lg"/>
-          </a:ln>
-        </p:spPr>
-        <p:style>
-          <a:lnRef idx="1">
-            <a:schemeClr val="accent1"/>
-          </a:lnRef>
-          <a:fillRef idx="0">
-            <a:schemeClr val="accent1"/>
-          </a:fillRef>
-          <a:effectRef idx="0">
-            <a:schemeClr val="accent1"/>
-          </a:effectRef>
-          <a:fontRef idx="minor">
-            <a:schemeClr val="tx1"/>
-          </a:fontRef>
-        </p:style>
-      </p:cxnSp>
-      <p:sp>
-        <p:nvSpPr>
-          <p:cNvPr id="40" name="Rectangle : coins arrondis 39">
-            <a:extLst>
-              <a:ext uri="{FF2B5EF4-FFF2-40B4-BE49-F238E27FC236}">
-                <a16:creationId xmlns:a16="http://schemas.microsoft.com/office/drawing/2014/main" id="{56F2DF58-EC9E-4922-A566-2D75CDCC10C3}"/>
+      <p:sp>
+        <p:nvSpPr>
+          <p:cNvPr id="20" name="Rectangle : coins arrondis 19">
+            <a:extLst>
+              <a:ext uri="{FF2B5EF4-FFF2-40B4-BE49-F238E27FC236}">
+                <a16:creationId xmlns:a16="http://schemas.microsoft.com/office/drawing/2014/main" id="{901099DD-3727-4940-BD19-B718A95D7A9C}"/>
               </a:ext>
             </a:extLst>
           </p:cNvPr>
@@ -3876,7 +3863,7 @@
         </p:nvSpPr>
         <p:spPr>
           <a:xfrm>
-            <a:off x="9124495" y="4381976"/>
+            <a:off x="9230511" y="3739254"/>
             <a:ext cx="2283724" cy="910440"/>
           </a:xfrm>
           <a:prstGeom prst="roundRect">
@@ -3946,22 +3933,23 @@
       </p:sp>
       <p:cxnSp>
         <p:nvCxnSpPr>
-          <p:cNvPr id="48" name="Connecteur droit avec flèche 47">
-            <a:extLst>
-              <a:ext uri="{FF2B5EF4-FFF2-40B4-BE49-F238E27FC236}">
-                <a16:creationId xmlns:a16="http://schemas.microsoft.com/office/drawing/2014/main" id="{BBD92E82-BDCF-4C74-BEA1-9C997A349A10}"/>
+          <p:cNvPr id="21" name="Connecteur droit avec flèche 20">
+            <a:extLst>
+              <a:ext uri="{FF2B5EF4-FFF2-40B4-BE49-F238E27FC236}">
+                <a16:creationId xmlns:a16="http://schemas.microsoft.com/office/drawing/2014/main" id="{7C5825B5-A884-4D50-A184-89C173173F7D}"/>
               </a:ext>
             </a:extLst>
           </p:cNvPr>
           <p:cNvCxnSpPr>
             <a:cxnSpLocks/>
+            <a:endCxn id="20" idx="1"/>
           </p:cNvCxnSpPr>
           <p:nvPr/>
         </p:nvCxnSpPr>
         <p:spPr>
           <a:xfrm flipV="1">
-            <a:off x="8371114" y="4837197"/>
-            <a:ext cx="753381" cy="715118"/>
+            <a:off x="8852452" y="4194474"/>
+            <a:ext cx="378059" cy="1122232"/>
           </a:xfrm>
           <a:prstGeom prst="straightConnector1">
             <a:avLst/>
@@ -3990,10 +3978,10 @@
       </p:cxnSp>
       <p:cxnSp>
         <p:nvCxnSpPr>
-          <p:cNvPr id="23" name="Connecteur droit avec flèche 22">
-            <a:extLst>
-              <a:ext uri="{FF2B5EF4-FFF2-40B4-BE49-F238E27FC236}">
-                <a16:creationId xmlns:a16="http://schemas.microsoft.com/office/drawing/2014/main" id="{1D94E37D-E528-415C-A168-E78271A053EB}"/>
+          <p:cNvPr id="22" name="Connecteur droit avec flèche 21">
+            <a:extLst>
+              <a:ext uri="{FF2B5EF4-FFF2-40B4-BE49-F238E27FC236}">
+                <a16:creationId xmlns:a16="http://schemas.microsoft.com/office/drawing/2014/main" id="{BB963562-E390-4D2F-A9B2-4BCECF6E5ECF}"/>
               </a:ext>
             </a:extLst>
           </p:cNvPr>
@@ -4034,10 +4022,10 @@
       </p:cxnSp>
       <p:sp>
         <p:nvSpPr>
-          <p:cNvPr id="27" name="Rectangle : coins arrondis 26">
-            <a:extLst>
-              <a:ext uri="{FF2B5EF4-FFF2-40B4-BE49-F238E27FC236}">
-                <a16:creationId xmlns:a16="http://schemas.microsoft.com/office/drawing/2014/main" id="{00D3AF3A-DC87-4AD5-A45A-7970BEDF9855}"/>
+          <p:cNvPr id="25" name="Rectangle : coins arrondis 24">
+            <a:extLst>
+              <a:ext uri="{FF2B5EF4-FFF2-40B4-BE49-F238E27FC236}">
+                <a16:creationId xmlns:a16="http://schemas.microsoft.com/office/drawing/2014/main" id="{A0C22571-EE0E-4D9A-861A-EC043A8C1743}"/>
               </a:ext>
             </a:extLst>
           </p:cNvPr>
@@ -4149,10 +4137,10 @@
       </p:sp>
       <p:sp>
         <p:nvSpPr>
-          <p:cNvPr id="28" name="Rectangle : coins arrondis 27">
-            <a:extLst>
-              <a:ext uri="{FF2B5EF4-FFF2-40B4-BE49-F238E27FC236}">
-                <a16:creationId xmlns:a16="http://schemas.microsoft.com/office/drawing/2014/main" id="{F8258634-CE44-4221-9F7A-F381A5941379}"/>
+          <p:cNvPr id="30" name="Rectangle : coins arrondis 29">
+            <a:extLst>
+              <a:ext uri="{FF2B5EF4-FFF2-40B4-BE49-F238E27FC236}">
+                <a16:creationId xmlns:a16="http://schemas.microsoft.com/office/drawing/2014/main" id="{5F3750A8-F7BE-4DCB-9170-D310753E3CBF}"/>
               </a:ext>
             </a:extLst>
           </p:cNvPr>
@@ -4161,12 +4149,12 @@
         </p:nvSpPr>
         <p:spPr>
           <a:xfrm>
-            <a:off x="2686498" y="1123140"/>
-            <a:ext cx="2750585" cy="4299346"/>
+            <a:off x="2699108" y="1144887"/>
+            <a:ext cx="2750585" cy="4613183"/>
           </a:xfrm>
           <a:prstGeom prst="roundRect">
             <a:avLst>
-              <a:gd name="adj" fmla="val 8884"/>
+              <a:gd name="adj" fmla="val 5271"/>
             </a:avLst>
           </a:prstGeom>
           <a:noFill/>
@@ -4491,13 +4479,32 @@
                   <a:srgbClr val="0070C0"/>
                 </a:solidFill>
               </a:rPr>
-              <a:t>  code: </a:t>
+              <a:t>     </a:t>
             </a:r>
             <a:r>
               <a:rPr lang="en-US" sz="1600" noProof="1">
                 <a:solidFill>
+                  <a:srgbClr val="00B050"/>
+                </a:solidFill>
+              </a:rPr>
+              <a:t>specimenRequirements</a:t>
+            </a:r>
+          </a:p>
+          <a:p>
+            <a:pPr algn="ctr"/>
+            <a:r>
+              <a:rPr lang="en-US" sz="1600" noProof="1">
+                <a:solidFill>
                   <a:srgbClr val="0070C0"/>
                 </a:solidFill>
+              </a:rPr>
+              <a:t>code: </a:t>
+            </a:r>
+            <a:r>
+              <a:rPr lang="en-US" sz="1600" noProof="1">
+                <a:solidFill>
+                  <a:srgbClr val="0070C0"/>
+                </a:solidFill>
                 <a:sym typeface="Wingdings" panose="05000000000000000000" pitchFamily="2" charset="2"/>
               </a:rPr>
               <a:t>{</a:t>
@@ -4534,10 +4541,10 @@
       </p:sp>
       <p:sp>
         <p:nvSpPr>
-          <p:cNvPr id="29" name="ZoneTexte 28">
-            <a:extLst>
-              <a:ext uri="{FF2B5EF4-FFF2-40B4-BE49-F238E27FC236}">
-                <a16:creationId xmlns:a16="http://schemas.microsoft.com/office/drawing/2014/main" id="{314EAE70-5136-41CD-BD4C-891D23BEAC81}"/>
+          <p:cNvPr id="32" name="ZoneTexte 31">
+            <a:extLst>
+              <a:ext uri="{FF2B5EF4-FFF2-40B4-BE49-F238E27FC236}">
+                <a16:creationId xmlns:a16="http://schemas.microsoft.com/office/drawing/2014/main" id="{5FB58691-1ABE-44D1-9FF4-45A6DF5FCF5B}"/>
               </a:ext>
             </a:extLst>
           </p:cNvPr>

</xml_diff>